<commit_message>
Add new audio for Akshat intro
</commit_message>
<xml_diff>
--- a/Lectures/CourseIntroduction/Resources/Intro Lecture.pptx
+++ b/Lectures/CourseIntroduction/Resources/Intro Lecture.pptx
@@ -8,6 +8,7 @@
     <p:sldId id="263" r:id="rId2"/>
     <p:sldId id="262" r:id="rId3"/>
     <p:sldId id="264" r:id="rId4"/>
+    <p:sldId id="265" r:id="rId5"/>
   </p:sldIdLst>
   <p:sldSz cx="12192000" cy="6858000"/>
   <p:notesSz cx="6858000" cy="9144000"/>
@@ -344,7 +345,7 @@
             <a:fld id="{5923F103-BC34-4FE4-A40E-EDDEECFDA5D0}" type="datetimeFigureOut">
               <a:rPr lang="en-US" smtClean="0"/>
               <a:pPr/>
-              <a:t>11/4/2015</a:t>
+              <a:t>11/14/2015</a:t>
             </a:fld>
             <a:endParaRPr lang="en-US" dirty="0"/>
           </a:p>
@@ -684,7 +685,7 @@
           <a:p>
             <a:fld id="{923A1CC3-2375-41D4-9E03-427CAF2A4C1A}" type="datetimeFigureOut">
               <a:rPr lang="en-US" smtClean="0"/>
-              <a:t>11/4/2015</a:t>
+              <a:t>11/14/2015</a:t>
             </a:fld>
             <a:endParaRPr lang="en-US" dirty="0"/>
           </a:p>
@@ -968,7 +969,7 @@
           <a:p>
             <a:fld id="{AFF16868-8199-4C2C-A5B1-63AEE139F88E}" type="datetimeFigureOut">
               <a:rPr lang="en-US" smtClean="0"/>
-              <a:t>11/4/2015</a:t>
+              <a:t>11/14/2015</a:t>
             </a:fld>
             <a:endParaRPr lang="en-US" dirty="0"/>
           </a:p>
@@ -1542,7 +1543,7 @@
           <a:p>
             <a:fld id="{AAD9FF7F-6988-44CC-821B-644E70CD2F73}" type="datetimeFigureOut">
               <a:rPr lang="en-US" smtClean="0"/>
-              <a:t>11/4/2015</a:t>
+              <a:t>11/14/2015</a:t>
             </a:fld>
             <a:endParaRPr lang="en-US" dirty="0"/>
           </a:p>
@@ -2156,7 +2157,7 @@
           <a:p>
             <a:fld id="{5C12C299-16B2-4475-990D-751901EACC14}" type="datetimeFigureOut">
               <a:rPr lang="en-US" smtClean="0"/>
-              <a:t>11/4/2015</a:t>
+              <a:t>11/14/2015</a:t>
             </a:fld>
             <a:endParaRPr lang="en-US" dirty="0"/>
           </a:p>
@@ -2724,7 +2725,7 @@
           <a:p>
             <a:fld id="{2BE451C3-0FF4-47C4-B829-773ADF60F88C}" type="datetimeFigureOut">
               <a:rPr lang="en-US" smtClean="0"/>
-              <a:t>11/4/2015</a:t>
+              <a:t>11/14/2015</a:t>
             </a:fld>
             <a:endParaRPr lang="en-US" dirty="0"/>
           </a:p>
@@ -3058,7 +3059,7 @@
           <a:p>
             <a:fld id="{2BE451C3-0FF4-47C4-B829-773ADF60F88C}" type="datetimeFigureOut">
               <a:rPr lang="en-US" smtClean="0"/>
-              <a:t>11/4/2015</a:t>
+              <a:t>11/14/2015</a:t>
             </a:fld>
             <a:endParaRPr lang="en-US" dirty="0"/>
           </a:p>
@@ -3242,7 +3243,7 @@
           <a:p>
             <a:fld id="{53086D93-FCAC-47E0-A2EE-787E62CA814C}" type="datetimeFigureOut">
               <a:rPr lang="en-US" smtClean="0"/>
-              <a:t>11/4/2015</a:t>
+              <a:t>11/14/2015</a:t>
             </a:fld>
             <a:endParaRPr lang="en-US" dirty="0"/>
           </a:p>
@@ -3486,7 +3487,7 @@
           <a:p>
             <a:fld id="{CDA879A6-0FD0-4734-A311-86BFCA472E6E}" type="datetimeFigureOut">
               <a:rPr lang="en-US" smtClean="0"/>
-              <a:t>11/4/2015</a:t>
+              <a:t>11/14/2015</a:t>
             </a:fld>
             <a:endParaRPr lang="en-US" dirty="0"/>
           </a:p>
@@ -3692,7 +3693,7 @@
           <a:p>
             <a:fld id="{19C9CA7B-DFD4-44B5-8C60-D14B8CD1FB59}" type="datetimeFigureOut">
               <a:rPr lang="en-US" smtClean="0"/>
-              <a:t>11/4/2015</a:t>
+              <a:t>11/14/2015</a:t>
             </a:fld>
             <a:endParaRPr lang="en-US" dirty="0"/>
           </a:p>
@@ -3974,7 +3975,7 @@
           <a:p>
             <a:fld id="{F34E6425-0181-43F2-84FC-787E803FD2F8}" type="datetimeFigureOut">
               <a:rPr lang="en-US" smtClean="0"/>
-              <a:t>11/4/2015</a:t>
+              <a:t>11/14/2015</a:t>
             </a:fld>
             <a:endParaRPr lang="en-US" dirty="0"/>
           </a:p>
@@ -5033,7 +5034,7 @@
           <a:p>
             <a:fld id="{3BDB8791-F1B0-41E7-B7FD-A781E65C4266}" type="datetimeFigureOut">
               <a:rPr lang="en-US" smtClean="0"/>
-              <a:t>11/4/2015</a:t>
+              <a:t>11/14/2015</a:t>
             </a:fld>
             <a:endParaRPr lang="en-US" dirty="0"/>
           </a:p>
@@ -5413,7 +5414,7 @@
           <a:p>
             <a:fld id="{5FDD63B2-E120-4ED8-B27B-C685F510A5FE}" type="datetimeFigureOut">
               <a:rPr lang="en-US" smtClean="0"/>
-              <a:t>11/4/2015</a:t>
+              <a:t>11/14/2015</a:t>
             </a:fld>
             <a:endParaRPr lang="en-US" dirty="0"/>
           </a:p>
@@ -5567,7 +5568,7 @@
           <a:p>
             <a:fld id="{7AA18ACC-A947-437B-A130-35BD54FDF1E9}" type="datetimeFigureOut">
               <a:rPr lang="en-US" smtClean="0"/>
-              <a:t>11/4/2015</a:t>
+              <a:t>11/14/2015</a:t>
             </a:fld>
             <a:endParaRPr lang="en-US" dirty="0"/>
           </a:p>
@@ -5698,7 +5699,7 @@
           <a:p>
             <a:fld id="{7C8D7E02-BCB8-4D50-A234-369438C08659}" type="datetimeFigureOut">
               <a:rPr lang="en-US" smtClean="0"/>
-              <a:t>11/4/2015</a:t>
+              <a:t>11/14/2015</a:t>
             </a:fld>
             <a:endParaRPr lang="en-US" dirty="0"/>
           </a:p>
@@ -5989,7 +5990,7 @@
           <a:p>
             <a:fld id="{76E86A4C-8E40-4F87-A4F0-01A0687C5742}" type="datetimeFigureOut">
               <a:rPr lang="en-US" smtClean="0"/>
-              <a:t>11/4/2015</a:t>
+              <a:t>11/14/2015</a:t>
             </a:fld>
             <a:endParaRPr lang="en-US" dirty="0"/>
           </a:p>
@@ -6319,7 +6320,7 @@
           <a:p>
             <a:fld id="{35E72C73-2D91-4E12-BA25-F0AA0C03599B}" type="datetimeFigureOut">
               <a:rPr lang="en-US" smtClean="0"/>
-              <a:t>11/4/2015</a:t>
+              <a:t>11/14/2015</a:t>
             </a:fld>
             <a:endParaRPr lang="en-US" dirty="0"/>
           </a:p>
@@ -6539,7 +6540,7 @@
           <a:p>
             <a:fld id="{2BE451C3-0FF4-47C4-B829-773ADF60F88C}" type="datetimeFigureOut">
               <a:rPr lang="en-US" smtClean="0"/>
-              <a:t>11/4/2015</a:t>
+              <a:t>11/14/2015</a:t>
             </a:fld>
             <a:endParaRPr lang="en-US" dirty="0"/>
           </a:p>
@@ -7050,7 +7051,7 @@
       <p:bgPr>
         <a:blipFill dpi="0" rotWithShape="1">
           <a:blip r:embed="rId2">
-            <a:alphaModFix amt="96000"/>
+            <a:alphaModFix amt="91000"/>
             <a:lum/>
           </a:blip>
           <a:srcRect/>
@@ -7297,6 +7298,7 @@
       <p:bgPr>
         <a:blipFill dpi="0" rotWithShape="1">
           <a:blip r:embed="rId2">
+            <a:alphaModFix amt="87000"/>
             <a:lum/>
           </a:blip>
           <a:srcRect/>
@@ -7464,6 +7466,7 @@
       <p:bgPr>
         <a:blipFill dpi="0" rotWithShape="1">
           <a:blip r:embed="rId2">
+            <a:alphaModFix amt="80000"/>
             <a:lum/>
           </a:blip>
           <a:srcRect/>
@@ -7529,6 +7532,182 @@
     <p:extLst>
       <p:ext uri="{BB962C8B-B14F-4D97-AF65-F5344CB8AC3E}">
         <p14:creationId xmlns:p14="http://schemas.microsoft.com/office/powerpoint/2010/main" val="2082046924"/>
+      </p:ext>
+    </p:extLst>
+  </p:cSld>
+  <p:clrMapOvr>
+    <a:masterClrMapping/>
+  </p:clrMapOvr>
+  <p:timing>
+    <p:tnLst>
+      <p:par>
+        <p:cTn id="1" dur="indefinite" restart="never" nodeType="tmRoot">
+          <p:childTnLst>
+            <p:seq concurrent="1" nextAc="seek">
+              <p:cTn id="2" dur="indefinite" nodeType="mainSeq">
+                <p:childTnLst>
+                  <p:par>
+                    <p:cTn id="3" fill="hold">
+                      <p:stCondLst>
+                        <p:cond delay="indefinite"/>
+                      </p:stCondLst>
+                      <p:childTnLst>
+                        <p:par>
+                          <p:cTn id="4" fill="hold">
+                            <p:stCondLst>
+                              <p:cond delay="0"/>
+                            </p:stCondLst>
+                            <p:childTnLst>
+                              <p:par>
+                                <p:cTn id="5" presetID="10" presetClass="entr" presetSubtype="0" fill="hold" grpId="0" nodeType="clickEffect">
+                                  <p:stCondLst>
+                                    <p:cond delay="0"/>
+                                  </p:stCondLst>
+                                  <p:childTnLst>
+                                    <p:set>
+                                      <p:cBhvr>
+                                        <p:cTn id="6" dur="1" fill="hold">
+                                          <p:stCondLst>
+                                            <p:cond delay="0"/>
+                                          </p:stCondLst>
+                                        </p:cTn>
+                                        <p:tgtEl>
+                                          <p:spTgt spid="6"/>
+                                        </p:tgtEl>
+                                        <p:attrNameLst>
+                                          <p:attrName>style.visibility</p:attrName>
+                                        </p:attrNameLst>
+                                      </p:cBhvr>
+                                      <p:to>
+                                        <p:strVal val="visible"/>
+                                      </p:to>
+                                    </p:set>
+                                    <p:animEffect transition="in" filter="fade">
+                                      <p:cBhvr>
+                                        <p:cTn id="7" dur="500"/>
+                                        <p:tgtEl>
+                                          <p:spTgt spid="6"/>
+                                        </p:tgtEl>
+                                      </p:cBhvr>
+                                    </p:animEffect>
+                                  </p:childTnLst>
+                                </p:cTn>
+                              </p:par>
+                            </p:childTnLst>
+                          </p:cTn>
+                        </p:par>
+                      </p:childTnLst>
+                    </p:cTn>
+                  </p:par>
+                </p:childTnLst>
+              </p:cTn>
+              <p:prevCondLst>
+                <p:cond evt="onPrev" delay="0">
+                  <p:tgtEl>
+                    <p:sldTgt/>
+                  </p:tgtEl>
+                </p:cond>
+              </p:prevCondLst>
+              <p:nextCondLst>
+                <p:cond evt="onNext" delay="0">
+                  <p:tgtEl>
+                    <p:sldTgt/>
+                  </p:tgtEl>
+                </p:cond>
+              </p:nextCondLst>
+            </p:seq>
+          </p:childTnLst>
+        </p:cTn>
+      </p:par>
+    </p:tnLst>
+    <p:bldLst>
+      <p:bldP spid="6" grpId="0"/>
+    </p:bldLst>
+  </p:timing>
+</p:sld>
+</file>
+
+<file path=ppt/slides/slide4.xml><?xml version="1.0" encoding="utf-8"?>
+<p:sld xmlns:a="http://schemas.openxmlformats.org/drawingml/2006/main" xmlns:r="http://schemas.openxmlformats.org/officeDocument/2006/relationships" xmlns:p="http://schemas.openxmlformats.org/presentationml/2006/main" showMasterSp="0">
+  <p:cSld>
+    <p:bg>
+      <p:bgPr>
+        <a:blipFill dpi="0" rotWithShape="1">
+          <a:blip r:embed="rId2">
+            <a:alphaModFix amt="87000"/>
+            <a:lum/>
+          </a:blip>
+          <a:srcRect/>
+          <a:stretch>
+            <a:fillRect t="-9000" b="-9000"/>
+          </a:stretch>
+        </a:blipFill>
+        <a:effectLst/>
+      </p:bgPr>
+    </p:bg>
+    <p:spTree>
+      <p:nvGrpSpPr>
+        <p:cNvPr id="1" name=""/>
+        <p:cNvGrpSpPr/>
+        <p:nvPr/>
+      </p:nvGrpSpPr>
+      <p:grpSpPr>
+        <a:xfrm>
+          <a:off x="0" y="0"/>
+          <a:ext cx="0" cy="0"/>
+          <a:chOff x="0" y="0"/>
+          <a:chExt cx="0" cy="0"/>
+        </a:xfrm>
+      </p:grpSpPr>
+      <p:sp>
+        <p:nvSpPr>
+          <p:cNvPr id="6" name="Title 5"/>
+          <p:cNvSpPr>
+            <a:spLocks noGrp="1"/>
+          </p:cNvSpPr>
+          <p:nvPr>
+            <p:ph type="title"/>
+          </p:nvPr>
+        </p:nvSpPr>
+        <p:spPr>
+          <a:xfrm>
+            <a:off x="1030288" y="2700867"/>
+            <a:ext cx="10131425" cy="1456267"/>
+          </a:xfrm>
+        </p:spPr>
+        <p:txBody>
+          <a:bodyPr/>
+          <a:lstStyle/>
+          <a:p>
+            <a:pPr algn="ctr"/>
+            <a:r>
+              <a:rPr lang="en-US" b="1" cap="none" dirty="0" smtClean="0">
+                <a:latin typeface="Open Sans" panose="020B0606030504020204" pitchFamily="34" charset="0"/>
+                <a:ea typeface="Open Sans" panose="020B0606030504020204" pitchFamily="34" charset="0"/>
+                <a:cs typeface="Open Sans" panose="020B0606030504020204" pitchFamily="34" charset="0"/>
+              </a:rPr>
+              <a:t>Let’s ge</a:t>
+            </a:r>
+            <a:r>
+              <a:rPr lang="en-US" b="1" cap="none" dirty="0" smtClean="0">
+                <a:latin typeface="Open Sans" panose="020B0606030504020204" pitchFamily="34" charset="0"/>
+                <a:ea typeface="Open Sans" panose="020B0606030504020204" pitchFamily="34" charset="0"/>
+                <a:cs typeface="Open Sans" panose="020B0606030504020204" pitchFamily="34" charset="0"/>
+              </a:rPr>
+              <a:t>t rolling!!</a:t>
+            </a:r>
+            <a:endParaRPr lang="en-US" b="1" cap="none" dirty="0">
+              <a:latin typeface="Open Sans" panose="020B0606030504020204" pitchFamily="34" charset="0"/>
+              <a:ea typeface="Open Sans" panose="020B0606030504020204" pitchFamily="34" charset="0"/>
+              <a:cs typeface="Open Sans" panose="020B0606030504020204" pitchFamily="34" charset="0"/>
+            </a:endParaRPr>
+          </a:p>
+        </p:txBody>
+      </p:sp>
+    </p:spTree>
+    <p:extLst>
+      <p:ext uri="{BB962C8B-B14F-4D97-AF65-F5344CB8AC3E}">
+        <p14:creationId xmlns:p14="http://schemas.microsoft.com/office/powerpoint/2010/main" val="3861997970"/>
       </p:ext>
     </p:extLst>
   </p:cSld>

</xml_diff>